<commit_message>
Move to presentation version alpha
</commit_message>
<xml_diff>
--- a/presentation/bitmap-compression/bitmap-index-compression.pptx
+++ b/presentation/bitmap-compression/bitmap-index-compression.pptx
@@ -13,6 +13,11 @@
     <p:sldId id="261" r:id="rId7"/>
     <p:sldId id="262" r:id="rId8"/>
     <p:sldId id="263" r:id="rId9"/>
+    <p:sldId id="264" r:id="rId10"/>
+    <p:sldId id="266" r:id="rId11"/>
+    <p:sldId id="267" r:id="rId12"/>
+    <p:sldId id="268" r:id="rId13"/>
+    <p:sldId id="265" r:id="rId14"/>
   </p:sldIdLst>
   <p:sldSz cx="9144000" cy="6858000" type="screen4x3"/>
   <p:notesSz cx="6858000" cy="9144000"/>
@@ -308,7 +313,7 @@
           <a:p>
             <a:fld id="{FD17FA3B-C404-4317-B0BC-953931111309}" type="datetimeFigureOut">
               <a:rPr lang="pl-PL" smtClean="0"/>
-              <a:t>2012-05-06</a:t>
+              <a:t>2012-05-14</a:t>
             </a:fld>
             <a:endParaRPr lang="pl-PL"/>
           </a:p>
@@ -480,7 +485,7 @@
           <a:p>
             <a:fld id="{FD17FA3B-C404-4317-B0BC-953931111309}" type="datetimeFigureOut">
               <a:rPr lang="pl-PL" smtClean="0"/>
-              <a:t>2012-05-06</a:t>
+              <a:t>2012-05-14</a:t>
             </a:fld>
             <a:endParaRPr lang="pl-PL"/>
           </a:p>
@@ -662,7 +667,7 @@
           <a:p>
             <a:fld id="{FD17FA3B-C404-4317-B0BC-953931111309}" type="datetimeFigureOut">
               <a:rPr lang="pl-PL" smtClean="0"/>
-              <a:t>2012-05-06</a:t>
+              <a:t>2012-05-14</a:t>
             </a:fld>
             <a:endParaRPr lang="pl-PL"/>
           </a:p>
@@ -834,7 +839,7 @@
           <a:p>
             <a:fld id="{FD17FA3B-C404-4317-B0BC-953931111309}" type="datetimeFigureOut">
               <a:rPr lang="pl-PL" smtClean="0"/>
-              <a:t>2012-05-06</a:t>
+              <a:t>2012-05-14</a:t>
             </a:fld>
             <a:endParaRPr lang="pl-PL"/>
           </a:p>
@@ -1082,7 +1087,7 @@
           <a:p>
             <a:fld id="{FD17FA3B-C404-4317-B0BC-953931111309}" type="datetimeFigureOut">
               <a:rPr lang="pl-PL" smtClean="0"/>
-              <a:t>2012-05-06</a:t>
+              <a:t>2012-05-14</a:t>
             </a:fld>
             <a:endParaRPr lang="pl-PL"/>
           </a:p>
@@ -1372,7 +1377,7 @@
           <a:p>
             <a:fld id="{FD17FA3B-C404-4317-B0BC-953931111309}" type="datetimeFigureOut">
               <a:rPr lang="pl-PL" smtClean="0"/>
-              <a:t>2012-05-06</a:t>
+              <a:t>2012-05-14</a:t>
             </a:fld>
             <a:endParaRPr lang="pl-PL"/>
           </a:p>
@@ -1808,7 +1813,7 @@
           <a:p>
             <a:fld id="{FD17FA3B-C404-4317-B0BC-953931111309}" type="datetimeFigureOut">
               <a:rPr lang="pl-PL" smtClean="0"/>
-              <a:t>2012-05-06</a:t>
+              <a:t>2012-05-14</a:t>
             </a:fld>
             <a:endParaRPr lang="pl-PL"/>
           </a:p>
@@ -1928,7 +1933,7 @@
           <a:p>
             <a:fld id="{FD17FA3B-C404-4317-B0BC-953931111309}" type="datetimeFigureOut">
               <a:rPr lang="pl-PL" smtClean="0"/>
-              <a:t>2012-05-06</a:t>
+              <a:t>2012-05-14</a:t>
             </a:fld>
             <a:endParaRPr lang="pl-PL"/>
           </a:p>
@@ -2025,7 +2030,7 @@
           <a:p>
             <a:fld id="{FD17FA3B-C404-4317-B0BC-953931111309}" type="datetimeFigureOut">
               <a:rPr lang="pl-PL" smtClean="0"/>
-              <a:t>2012-05-06</a:t>
+              <a:t>2012-05-14</a:t>
             </a:fld>
             <a:endParaRPr lang="pl-PL"/>
           </a:p>
@@ -2221,7 +2226,7 @@
           <a:p>
             <a:fld id="{FD17FA3B-C404-4317-B0BC-953931111309}" type="datetimeFigureOut">
               <a:rPr lang="pl-PL" smtClean="0"/>
-              <a:t>2012-05-06</a:t>
+              <a:t>2012-05-14</a:t>
             </a:fld>
             <a:endParaRPr lang="pl-PL"/>
           </a:p>
@@ -2546,7 +2551,7 @@
           <a:p>
             <a:fld id="{FD17FA3B-C404-4317-B0BC-953931111309}" type="datetimeFigureOut">
               <a:rPr lang="pl-PL" smtClean="0"/>
-              <a:t>2012-05-06</a:t>
+              <a:t>2012-05-14</a:t>
             </a:fld>
             <a:endParaRPr lang="pl-PL"/>
           </a:p>
@@ -2932,7 +2937,7 @@
           <a:p>
             <a:fld id="{FD17FA3B-C404-4317-B0BC-953931111309}" type="datetimeFigureOut">
               <a:rPr lang="pl-PL" smtClean="0"/>
-              <a:t>2012-05-06</a:t>
+              <a:t>2012-05-14</a:t>
             </a:fld>
             <a:endParaRPr lang="pl-PL"/>
           </a:p>
@@ -3329,6 +3334,574 @@
 </p:sld>
 </file>
 
+<file path=ppt/slides/slide10.xml><?xml version="1.0" encoding="utf-8"?>
+<p:sld xmlns:a="http://schemas.openxmlformats.org/drawingml/2006/main" xmlns:r="http://schemas.openxmlformats.org/officeDocument/2006/relationships" xmlns:p="http://schemas.openxmlformats.org/presentationml/2006/main">
+  <p:cSld>
+    <p:spTree>
+      <p:nvGrpSpPr>
+        <p:cNvPr id="1" name=""/>
+        <p:cNvGrpSpPr/>
+        <p:nvPr/>
+      </p:nvGrpSpPr>
+      <p:grpSpPr>
+        <a:xfrm>
+          <a:off x="0" y="0"/>
+          <a:ext cx="0" cy="0"/>
+          <a:chOff x="0" y="0"/>
+          <a:chExt cx="0" cy="0"/>
+        </a:xfrm>
+      </p:grpSpPr>
+      <p:sp>
+        <p:nvSpPr>
+          <p:cNvPr id="2" name="Tytuł 1"/>
+          <p:cNvSpPr>
+            <a:spLocks noGrp="1"/>
+          </p:cNvSpPr>
+          <p:nvPr>
+            <p:ph type="title"/>
+          </p:nvPr>
+        </p:nvSpPr>
+        <p:spPr/>
+        <p:txBody>
+          <a:bodyPr/>
+          <a:lstStyle/>
+          <a:p>
+            <a:r>
+              <a:rPr lang="en-US" dirty="0" smtClean="0"/>
+              <a:t>Word aligned RLE</a:t>
+            </a:r>
+            <a:endParaRPr lang="en-US" dirty="0"/>
+          </a:p>
+        </p:txBody>
+      </p:sp>
+      <p:sp>
+        <p:nvSpPr>
+          <p:cNvPr id="3" name="Symbol zastępczy zawartości 2"/>
+          <p:cNvSpPr>
+            <a:spLocks noGrp="1"/>
+          </p:cNvSpPr>
+          <p:nvPr>
+            <p:ph idx="1"/>
+          </p:nvPr>
+        </p:nvSpPr>
+        <p:spPr/>
+        <p:txBody>
+          <a:bodyPr/>
+          <a:lstStyle/>
+          <a:p>
+            <a:r>
+              <a:rPr lang="en-US" dirty="0" smtClean="0"/>
+              <a:t>Machine word aligned</a:t>
+            </a:r>
+          </a:p>
+          <a:p>
+            <a:r>
+              <a:rPr lang="en-US" dirty="0" smtClean="0"/>
+              <a:t>Trade compression for speed</a:t>
+            </a:r>
+          </a:p>
+          <a:p>
+            <a:r>
+              <a:rPr lang="en-US" dirty="0" smtClean="0"/>
+              <a:t>BBC:</a:t>
+            </a:r>
+          </a:p>
+          <a:p>
+            <a:pPr lvl="1"/>
+            <a:r>
+              <a:rPr lang="en-US" dirty="0" smtClean="0"/>
+              <a:t>TODO </a:t>
+            </a:r>
+            <a:r>
+              <a:rPr lang="en-US" dirty="0" err="1" smtClean="0"/>
+              <a:t>opisc</a:t>
+            </a:r>
+            <a:r>
+              <a:rPr lang="en-US" dirty="0" smtClean="0"/>
+              <a:t> </a:t>
+            </a:r>
+            <a:r>
+              <a:rPr lang="en-US" dirty="0" err="1" smtClean="0"/>
+              <a:t>najlepiej</a:t>
+            </a:r>
+            <a:r>
+              <a:rPr lang="en-US" dirty="0" smtClean="0"/>
+              <a:t> </a:t>
+            </a:r>
+            <a:r>
+              <a:rPr lang="en-US" dirty="0" err="1" smtClean="0"/>
+              <a:t>na</a:t>
+            </a:r>
+            <a:r>
+              <a:rPr lang="en-US" dirty="0" smtClean="0"/>
+              <a:t> </a:t>
+            </a:r>
+            <a:r>
+              <a:rPr lang="en-US" dirty="0" err="1" smtClean="0"/>
+              <a:t>obrazku</a:t>
+            </a:r>
+            <a:endParaRPr lang="en-US" dirty="0"/>
+          </a:p>
+          <a:p>
+            <a:r>
+              <a:rPr lang="en-US" dirty="0" smtClean="0"/>
+              <a:t>WAH:</a:t>
+            </a:r>
+          </a:p>
+          <a:p>
+            <a:pPr lvl="1"/>
+            <a:r>
+              <a:rPr lang="en-US" dirty="0" smtClean="0"/>
+              <a:t>TODO </a:t>
+            </a:r>
+            <a:r>
+              <a:rPr lang="en-US" dirty="0" err="1" smtClean="0"/>
+              <a:t>opisac</a:t>
+            </a:r>
+            <a:r>
+              <a:rPr lang="en-US" dirty="0" smtClean="0"/>
+              <a:t> </a:t>
+            </a:r>
+            <a:r>
+              <a:rPr lang="en-US" dirty="0" err="1" smtClean="0"/>
+              <a:t>najlepiej</a:t>
+            </a:r>
+            <a:r>
+              <a:rPr lang="en-US" dirty="0" smtClean="0"/>
+              <a:t> </a:t>
+            </a:r>
+            <a:r>
+              <a:rPr lang="en-US" dirty="0" err="1" smtClean="0"/>
+              <a:t>na</a:t>
+            </a:r>
+            <a:r>
+              <a:rPr lang="en-US" dirty="0" smtClean="0"/>
+              <a:t> </a:t>
+            </a:r>
+            <a:r>
+              <a:rPr lang="en-US" dirty="0" err="1" smtClean="0"/>
+              <a:t>obrazku</a:t>
+            </a:r>
+            <a:endParaRPr lang="en-US" dirty="0"/>
+          </a:p>
+        </p:txBody>
+      </p:sp>
+    </p:spTree>
+    <p:extLst>
+      <p:ext uri="{BB962C8B-B14F-4D97-AF65-F5344CB8AC3E}">
+        <p14:creationId xmlns:p14="http://schemas.microsoft.com/office/powerpoint/2010/main" val="3800815728"/>
+      </p:ext>
+    </p:extLst>
+  </p:cSld>
+  <p:clrMapOvr>
+    <a:masterClrMapping/>
+  </p:clrMapOvr>
+</p:sld>
+</file>
+
+<file path=ppt/slides/slide11.xml><?xml version="1.0" encoding="utf-8"?>
+<p:sld xmlns:a="http://schemas.openxmlformats.org/drawingml/2006/main" xmlns:r="http://schemas.openxmlformats.org/officeDocument/2006/relationships" xmlns:p="http://schemas.openxmlformats.org/presentationml/2006/main">
+  <p:cSld>
+    <p:spTree>
+      <p:nvGrpSpPr>
+        <p:cNvPr id="1" name=""/>
+        <p:cNvGrpSpPr/>
+        <p:nvPr/>
+      </p:nvGrpSpPr>
+      <p:grpSpPr>
+        <a:xfrm>
+          <a:off x="0" y="0"/>
+          <a:ext cx="0" cy="0"/>
+          <a:chOff x="0" y="0"/>
+          <a:chExt cx="0" cy="0"/>
+        </a:xfrm>
+      </p:grpSpPr>
+      <p:sp>
+        <p:nvSpPr>
+          <p:cNvPr id="2" name="Tytuł 1"/>
+          <p:cNvSpPr>
+            <a:spLocks noGrp="1"/>
+          </p:cNvSpPr>
+          <p:nvPr>
+            <p:ph type="title"/>
+          </p:nvPr>
+        </p:nvSpPr>
+        <p:spPr/>
+        <p:txBody>
+          <a:bodyPr/>
+          <a:lstStyle/>
+          <a:p>
+            <a:r>
+              <a:rPr lang="en-US" dirty="0" smtClean="0"/>
+              <a:t>Efficiency definition</a:t>
+            </a:r>
+            <a:endParaRPr lang="en-US" dirty="0"/>
+          </a:p>
+        </p:txBody>
+      </p:sp>
+      <p:sp>
+        <p:nvSpPr>
+          <p:cNvPr id="3" name="Symbol zastępczy zawartości 2"/>
+          <p:cNvSpPr>
+            <a:spLocks noGrp="1"/>
+          </p:cNvSpPr>
+          <p:nvPr>
+            <p:ph idx="1"/>
+          </p:nvPr>
+        </p:nvSpPr>
+        <p:spPr/>
+        <p:txBody>
+          <a:bodyPr/>
+          <a:lstStyle/>
+          <a:p>
+            <a:r>
+              <a:rPr lang="en-US" dirty="0" smtClean="0"/>
+              <a:t>Operation such as: B</a:t>
+            </a:r>
+            <a:r>
+              <a:rPr lang="en-US" baseline="-25000" dirty="0" smtClean="0"/>
+              <a:t>1</a:t>
+            </a:r>
+            <a:r>
+              <a:rPr lang="en-US" dirty="0" smtClean="0"/>
+              <a:t> v B</a:t>
+            </a:r>
+            <a:r>
+              <a:rPr lang="en-US" baseline="-25000" dirty="0"/>
+              <a:t>2</a:t>
+            </a:r>
+            <a:r>
+              <a:rPr lang="en-US" dirty="0" smtClean="0"/>
+              <a:t> or </a:t>
+            </a:r>
+            <a:r>
+              <a:rPr lang="en-US" dirty="0"/>
+              <a:t>B</a:t>
+            </a:r>
+            <a:r>
+              <a:rPr lang="en-US" baseline="-25000" dirty="0"/>
+              <a:t>1</a:t>
+            </a:r>
+            <a:r>
+              <a:rPr lang="en-US" dirty="0"/>
+              <a:t> </a:t>
+            </a:r>
+            <a:r>
+              <a:rPr lang="en-US" dirty="0" smtClean="0"/>
+              <a:t>^ </a:t>
+            </a:r>
+            <a:r>
+              <a:rPr lang="en-US" dirty="0"/>
+              <a:t>B</a:t>
+            </a:r>
+            <a:r>
+              <a:rPr lang="en-US" baseline="-25000" dirty="0"/>
+              <a:t>2</a:t>
+            </a:r>
+            <a:r>
+              <a:rPr lang="en-US" dirty="0" smtClean="0"/>
+              <a:t> </a:t>
+            </a:r>
+          </a:p>
+          <a:p>
+            <a:r>
+              <a:rPr lang="en-US" dirty="0" smtClean="0"/>
+              <a:t>Go in time: O(|B</a:t>
+            </a:r>
+            <a:r>
+              <a:rPr lang="en-US" baseline="-25000" dirty="0" smtClean="0"/>
+              <a:t>1</a:t>
+            </a:r>
+            <a:r>
+              <a:rPr lang="en-US" dirty="0" smtClean="0"/>
+              <a:t>| + |B</a:t>
+            </a:r>
+            <a:r>
+              <a:rPr lang="en-US" baseline="-25000" dirty="0" smtClean="0"/>
+              <a:t>2</a:t>
+            </a:r>
+            <a:r>
+              <a:rPr lang="en-US" dirty="0" smtClean="0"/>
+              <a:t>|)</a:t>
+            </a:r>
+          </a:p>
+          <a:p>
+            <a:r>
+              <a:rPr lang="en-US" dirty="0" smtClean="0"/>
+              <a:t>All RLE – like indices </a:t>
+            </a:r>
+            <a:r>
+              <a:rPr lang="en-US" b="1" dirty="0" smtClean="0"/>
+              <a:t>are sorting aware</a:t>
+            </a:r>
+          </a:p>
+          <a:p>
+            <a:r>
+              <a:rPr lang="en-US" dirty="0" smtClean="0"/>
+              <a:t>Finding the best sorting is NP-hard [</a:t>
+            </a:r>
+            <a:r>
+              <a:rPr lang="en-US" dirty="0" err="1" smtClean="0"/>
+              <a:t>Lemire</a:t>
+            </a:r>
+            <a:r>
+              <a:rPr lang="en-US" dirty="0" smtClean="0"/>
+              <a:t> et al. 2009]</a:t>
+            </a:r>
+          </a:p>
+          <a:p>
+            <a:pPr marL="114300" indent="0">
+              <a:buNone/>
+            </a:pPr>
+            <a:endParaRPr lang="en-US" dirty="0" smtClean="0"/>
+          </a:p>
+          <a:p>
+            <a:endParaRPr lang="en-US" dirty="0"/>
+          </a:p>
+        </p:txBody>
+      </p:sp>
+    </p:spTree>
+    <p:extLst>
+      <p:ext uri="{BB962C8B-B14F-4D97-AF65-F5344CB8AC3E}">
+        <p14:creationId xmlns:p14="http://schemas.microsoft.com/office/powerpoint/2010/main" val="2676660256"/>
+      </p:ext>
+    </p:extLst>
+  </p:cSld>
+  <p:clrMapOvr>
+    <a:masterClrMapping/>
+  </p:clrMapOvr>
+</p:sld>
+</file>
+
+<file path=ppt/slides/slide12.xml><?xml version="1.0" encoding="utf-8"?>
+<p:sld xmlns:a="http://schemas.openxmlformats.org/drawingml/2006/main" xmlns:r="http://schemas.openxmlformats.org/officeDocument/2006/relationships" xmlns:p="http://schemas.openxmlformats.org/presentationml/2006/main">
+  <p:cSld>
+    <p:spTree>
+      <p:nvGrpSpPr>
+        <p:cNvPr id="1" name=""/>
+        <p:cNvGrpSpPr/>
+        <p:nvPr/>
+      </p:nvGrpSpPr>
+      <p:grpSpPr>
+        <a:xfrm>
+          <a:off x="0" y="0"/>
+          <a:ext cx="0" cy="0"/>
+          <a:chOff x="0" y="0"/>
+          <a:chExt cx="0" cy="0"/>
+        </a:xfrm>
+      </p:grpSpPr>
+      <p:sp>
+        <p:nvSpPr>
+          <p:cNvPr id="2" name="Tytuł 1"/>
+          <p:cNvSpPr>
+            <a:spLocks noGrp="1"/>
+          </p:cNvSpPr>
+          <p:nvPr>
+            <p:ph type="title"/>
+          </p:nvPr>
+        </p:nvSpPr>
+        <p:spPr/>
+        <p:txBody>
+          <a:bodyPr/>
+          <a:lstStyle/>
+          <a:p>
+            <a:r>
+              <a:rPr lang="en-US" dirty="0" smtClean="0"/>
+              <a:t>Some tricks</a:t>
+            </a:r>
+            <a:endParaRPr lang="en-US" dirty="0"/>
+          </a:p>
+        </p:txBody>
+      </p:sp>
+      <p:sp>
+        <p:nvSpPr>
+          <p:cNvPr id="3" name="Symbol zastępczy zawartości 2"/>
+          <p:cNvSpPr>
+            <a:spLocks noGrp="1"/>
+          </p:cNvSpPr>
+          <p:nvPr>
+            <p:ph idx="1"/>
+          </p:nvPr>
+        </p:nvSpPr>
+        <p:spPr/>
+        <p:txBody>
+          <a:bodyPr/>
+          <a:lstStyle/>
+          <a:p>
+            <a:r>
+              <a:rPr lang="en-US" dirty="0" smtClean="0"/>
+              <a:t>K of N encoding</a:t>
+            </a:r>
+          </a:p>
+          <a:p>
+            <a:r>
+              <a:rPr lang="en-US" dirty="0"/>
+              <a:t>Hierarchical </a:t>
+            </a:r>
+            <a:r>
+              <a:rPr lang="en-US" dirty="0" smtClean="0"/>
+              <a:t>indexes</a:t>
+            </a:r>
+          </a:p>
+          <a:p>
+            <a:r>
+              <a:rPr lang="en-US" dirty="0" smtClean="0"/>
+              <a:t>Sorting orders:</a:t>
+            </a:r>
+          </a:p>
+          <a:p>
+            <a:pPr lvl="1"/>
+            <a:r>
+              <a:rPr lang="en-US" dirty="0"/>
+              <a:t>Lexicographical order</a:t>
+            </a:r>
+            <a:endParaRPr lang="en-US" dirty="0" smtClean="0"/>
+          </a:p>
+          <a:p>
+            <a:pPr lvl="1"/>
+            <a:r>
+              <a:rPr lang="en-US" dirty="0" smtClean="0"/>
+              <a:t>Grey order</a:t>
+            </a:r>
+            <a:endParaRPr lang="en-US" dirty="0"/>
+          </a:p>
+        </p:txBody>
+      </p:sp>
+    </p:spTree>
+    <p:extLst>
+      <p:ext uri="{BB962C8B-B14F-4D97-AF65-F5344CB8AC3E}">
+        <p14:creationId xmlns:p14="http://schemas.microsoft.com/office/powerpoint/2010/main" val="290868033"/>
+      </p:ext>
+    </p:extLst>
+  </p:cSld>
+  <p:clrMapOvr>
+    <a:masterClrMapping/>
+  </p:clrMapOvr>
+</p:sld>
+</file>
+
+<file path=ppt/slides/slide13.xml><?xml version="1.0" encoding="utf-8"?>
+<p:sld xmlns:a="http://schemas.openxmlformats.org/drawingml/2006/main" xmlns:r="http://schemas.openxmlformats.org/officeDocument/2006/relationships" xmlns:p="http://schemas.openxmlformats.org/presentationml/2006/main">
+  <p:cSld>
+    <p:spTree>
+      <p:nvGrpSpPr>
+        <p:cNvPr id="1" name=""/>
+        <p:cNvGrpSpPr/>
+        <p:nvPr/>
+      </p:nvGrpSpPr>
+      <p:grpSpPr>
+        <a:xfrm>
+          <a:off x="0" y="0"/>
+          <a:ext cx="0" cy="0"/>
+          <a:chOff x="0" y="0"/>
+          <a:chExt cx="0" cy="0"/>
+        </a:xfrm>
+      </p:grpSpPr>
+      <p:sp>
+        <p:nvSpPr>
+          <p:cNvPr id="2" name="Tytuł 1"/>
+          <p:cNvSpPr>
+            <a:spLocks noGrp="1"/>
+          </p:cNvSpPr>
+          <p:nvPr>
+            <p:ph type="title"/>
+          </p:nvPr>
+        </p:nvSpPr>
+        <p:spPr/>
+        <p:txBody>
+          <a:bodyPr/>
+          <a:lstStyle/>
+          <a:p>
+            <a:r>
+              <a:rPr lang="en-US" dirty="0" smtClean="0"/>
+              <a:t>Software</a:t>
+            </a:r>
+            <a:endParaRPr lang="en-US" dirty="0"/>
+          </a:p>
+        </p:txBody>
+      </p:sp>
+      <p:sp>
+        <p:nvSpPr>
+          <p:cNvPr id="3" name="Symbol zastępczy zawartości 2"/>
+          <p:cNvSpPr>
+            <a:spLocks noGrp="1"/>
+          </p:cNvSpPr>
+          <p:nvPr>
+            <p:ph idx="1"/>
+          </p:nvPr>
+        </p:nvSpPr>
+        <p:spPr/>
+        <p:txBody>
+          <a:bodyPr/>
+          <a:lstStyle/>
+          <a:p>
+            <a:r>
+              <a:rPr lang="en-US" dirty="0" smtClean="0"/>
+              <a:t>Lemur </a:t>
+            </a:r>
+            <a:r>
+              <a:rPr lang="en-US" dirty="0"/>
+              <a:t>Bitmap Index: </a:t>
+            </a:r>
+            <a:r>
+              <a:rPr lang="en-US" sz="2000" i="1" dirty="0"/>
+              <a:t>http</a:t>
+            </a:r>
+            <a:r>
+              <a:rPr lang="en-US" sz="2000" i="1" dirty="0" smtClean="0"/>
+              <a:t>://code.google.com/p/lemurbitmapindex</a:t>
+            </a:r>
+          </a:p>
+          <a:p>
+            <a:r>
+              <a:rPr lang="en-US" dirty="0" err="1" smtClean="0"/>
+              <a:t>FastBit</a:t>
+            </a:r>
+            <a:r>
+              <a:rPr lang="en-US" dirty="0" smtClean="0"/>
+              <a:t>: </a:t>
+            </a:r>
+            <a:r>
+              <a:rPr lang="en-US" sz="2000" i="1" dirty="0"/>
+              <a:t>http://crd-legacy.lbl.gov/~kewu/fastbit/</a:t>
+            </a:r>
+          </a:p>
+          <a:p>
+            <a:r>
+              <a:rPr lang="en-US" dirty="0" err="1" smtClean="0"/>
+              <a:t>JavaEWAH</a:t>
+            </a:r>
+            <a:r>
+              <a:rPr lang="en-US" dirty="0"/>
+              <a:t>: </a:t>
+            </a:r>
+            <a:r>
+              <a:rPr lang="en-US" sz="2000" i="1" dirty="0"/>
+              <a:t>http://code.google.com/p/javaewah/</a:t>
+            </a:r>
+            <a:endParaRPr lang="en-US" sz="2000" i="1" dirty="0" smtClean="0"/>
+          </a:p>
+          <a:p>
+            <a:endParaRPr lang="en-US" dirty="0"/>
+          </a:p>
+          <a:p>
+            <a:endParaRPr lang="en-US" dirty="0"/>
+          </a:p>
+        </p:txBody>
+      </p:sp>
+    </p:spTree>
+    <p:extLst>
+      <p:ext uri="{BB962C8B-B14F-4D97-AF65-F5344CB8AC3E}">
+        <p14:creationId xmlns:p14="http://schemas.microsoft.com/office/powerpoint/2010/main" val="2768519562"/>
+      </p:ext>
+    </p:extLst>
+  </p:cSld>
+  <p:clrMapOvr>
+    <a:masterClrMapping/>
+  </p:clrMapOvr>
+</p:sld>
+</file>
+
 <file path=ppt/slides/slide2.xml><?xml version="1.0" encoding="utf-8"?>
 <p:sld xmlns:a="http://schemas.openxmlformats.org/drawingml/2006/main" xmlns:r="http://schemas.openxmlformats.org/officeDocument/2006/relationships" xmlns:p="http://schemas.openxmlformats.org/presentationml/2006/main">
   <p:cSld>
@@ -3381,7 +3954,9 @@
         </p:nvSpPr>
         <p:spPr/>
         <p:txBody>
-          <a:bodyPr/>
+          <a:bodyPr>
+            <a:normAutofit fontScale="92500" lnSpcReduction="10000"/>
+          </a:bodyPr>
           <a:lstStyle/>
           <a:p>
             <a:r>
@@ -3398,12 +3973,8 @@
           <a:p>
             <a:pPr lvl="1"/>
             <a:r>
-              <a:rPr lang="en-US" smtClean="0"/>
-              <a:t>Column indexes for </a:t>
-            </a:r>
-            <a:r>
-              <a:rPr lang="en-US" dirty="0" smtClean="0"/>
-              <a:t>OLTP databases</a:t>
+              <a:rPr lang="en-US" dirty="0" smtClean="0"/>
+              <a:t>Column indexes for OLTP databases</a:t>
             </a:r>
           </a:p>
           <a:p>
@@ -3428,8 +3999,59 @@
           <a:p>
             <a:r>
               <a:rPr lang="en-US" dirty="0" smtClean="0"/>
-              <a:t>What does efficient compression really mean ?</a:t>
-            </a:r>
+              <a:t>What does efficient compression really mean </a:t>
+            </a:r>
+            <a:r>
+              <a:rPr lang="en-US" dirty="0" smtClean="0"/>
+              <a:t>?</a:t>
+            </a:r>
+          </a:p>
+          <a:p>
+            <a:r>
+              <a:rPr lang="en-US" dirty="0" smtClean="0"/>
+              <a:t>Typical Algorithms of Compression:</a:t>
+            </a:r>
+          </a:p>
+          <a:p>
+            <a:pPr lvl="1"/>
+            <a:r>
+              <a:rPr lang="en-US" dirty="0" smtClean="0"/>
+              <a:t>RLE</a:t>
+            </a:r>
+          </a:p>
+          <a:p>
+            <a:pPr lvl="1"/>
+            <a:r>
+              <a:rPr lang="en-US" dirty="0" smtClean="0"/>
+              <a:t>Delta / Gamma codes</a:t>
+            </a:r>
+          </a:p>
+          <a:p>
+            <a:pPr lvl="1"/>
+            <a:r>
+              <a:rPr lang="en-US" dirty="0" smtClean="0"/>
+              <a:t>BBC</a:t>
+            </a:r>
+          </a:p>
+          <a:p>
+            <a:pPr lvl="1"/>
+            <a:r>
+              <a:rPr lang="en-US" dirty="0" smtClean="0"/>
+              <a:t>WAH</a:t>
+            </a:r>
+          </a:p>
+          <a:p>
+            <a:r>
+              <a:rPr lang="en-US" dirty="0" smtClean="0"/>
+              <a:t>Sorting values</a:t>
+            </a:r>
+          </a:p>
+          <a:p>
+            <a:r>
+              <a:rPr lang="en-US" dirty="0" smtClean="0"/>
+              <a:t>What about: Huffman, Arithmetic Coding, LZ77 ?</a:t>
+            </a:r>
+            <a:endParaRPr lang="en-US" dirty="0" smtClean="0"/>
           </a:p>
         </p:txBody>
       </p:sp>
@@ -3501,6 +4123,52 @@
           <a:bodyPr/>
           <a:lstStyle/>
           <a:p>
+            <a:r>
+              <a:rPr lang="en-US" dirty="0"/>
+              <a:t>Daniel </a:t>
+            </a:r>
+            <a:r>
+              <a:rPr lang="en-US" dirty="0" err="1" smtClean="0"/>
+              <a:t>Lemire</a:t>
+            </a:r>
+            <a:r>
+              <a:rPr lang="en-US" dirty="0" smtClean="0"/>
+              <a:t> presentations </a:t>
+            </a:r>
+            <a:r>
+              <a:rPr lang="en-US" dirty="0" smtClean="0"/>
+              <a:t>about OLAP and </a:t>
+            </a:r>
+            <a:r>
+              <a:rPr lang="en-US" b="1" dirty="0" smtClean="0"/>
+              <a:t>indices / indexes</a:t>
+            </a:r>
+          </a:p>
+          <a:p>
+            <a:r>
+              <a:rPr lang="en-US" dirty="0"/>
+              <a:t>Fast Bit  </a:t>
+            </a:r>
+          </a:p>
+          <a:p>
+            <a:r>
+              <a:rPr lang="en-US" dirty="0" smtClean="0"/>
+              <a:t>Wikipedia</a:t>
+            </a:r>
+          </a:p>
+          <a:p>
+            <a:r>
+              <a:rPr lang="en-US" dirty="0" smtClean="0"/>
+              <a:t>Oracle Documentation </a:t>
+            </a:r>
+          </a:p>
+          <a:p>
+            <a:endParaRPr lang="en-US" dirty="0" smtClean="0"/>
+          </a:p>
+          <a:p>
+            <a:endParaRPr lang="en-US" dirty="0" smtClean="0"/>
+          </a:p>
+          <a:p>
             <a:endParaRPr lang="en-US" dirty="0"/>
           </a:p>
         </p:txBody>
@@ -3574,24 +4242,102 @@
           <a:lstStyle/>
           <a:p>
             <a:r>
+              <a:rPr lang="en-US" dirty="0" smtClean="0"/>
+              <a:t>Compute the union of two sets of </a:t>
+            </a:r>
+            <a:r>
               <a:rPr lang="en-US" dirty="0" err="1" smtClean="0"/>
-              <a:t>Obrazek</a:t>
+              <a:t>rowID</a:t>
             </a:r>
             <a:r>
               <a:rPr lang="en-US" dirty="0" smtClean="0"/>
               <a:t> </a:t>
             </a:r>
             <a:r>
+              <a:rPr lang="en-US" dirty="0" smtClean="0"/>
+              <a:t>– </a:t>
+            </a:r>
+            <a:r>
+              <a:rPr lang="en-US" dirty="0" smtClean="0"/>
+              <a:t>Bitwise OR </a:t>
+            </a:r>
+          </a:p>
+          <a:p>
+            <a:r>
+              <a:rPr lang="en-US" dirty="0" smtClean="0"/>
+              <a:t>Search for </a:t>
+            </a:r>
+            <a:r>
               <a:rPr lang="en-US" dirty="0" err="1" smtClean="0"/>
-              <a:t>tutaj</a:t>
-            </a:r>
-            <a:endParaRPr lang="en-US" dirty="0" smtClean="0"/>
-          </a:p>
-          <a:p>
-            <a:endParaRPr lang="en-US" dirty="0"/>
-          </a:p>
-          <a:p>
-            <a:endParaRPr lang="en-US" dirty="0"/>
+              <a:t>rowID</a:t>
+            </a:r>
+            <a:r>
+              <a:rPr lang="en-US" dirty="0" smtClean="0"/>
+              <a:t> in database – Bitwise AND</a:t>
+            </a:r>
+          </a:p>
+          <a:p>
+            <a:r>
+              <a:rPr lang="en-US" i="1" dirty="0" smtClean="0"/>
+              <a:t>n</a:t>
+            </a:r>
+            <a:r>
+              <a:rPr lang="en-US" dirty="0" smtClean="0"/>
+              <a:t> values for </a:t>
+            </a:r>
+            <a:r>
+              <a:rPr lang="en-US" i="1" dirty="0" smtClean="0"/>
+              <a:t>L</a:t>
+            </a:r>
+            <a:r>
+              <a:rPr lang="en-US" dirty="0" smtClean="0"/>
+              <a:t> distinct values </a:t>
+            </a:r>
+          </a:p>
+          <a:p>
+            <a:r>
+              <a:rPr lang="en-US" i="1" dirty="0" err="1" smtClean="0"/>
+              <a:t>nL</a:t>
+            </a:r>
+            <a:r>
+              <a:rPr lang="en-US" i="1" dirty="0" smtClean="0"/>
+              <a:t> </a:t>
+            </a:r>
+            <a:r>
+              <a:rPr lang="en-US" dirty="0" smtClean="0"/>
+              <a:t>bits</a:t>
+            </a:r>
+          </a:p>
+          <a:p>
+            <a:r>
+              <a:rPr lang="en-US" i="1" dirty="0" smtClean="0"/>
+              <a:t>L </a:t>
+            </a:r>
+            <a:r>
+              <a:rPr lang="en-US" dirty="0" smtClean="0"/>
+              <a:t>= 10</a:t>
+            </a:r>
+            <a:r>
+              <a:rPr lang="en-US" baseline="30000" dirty="0" smtClean="0"/>
+              <a:t>4</a:t>
+            </a:r>
+            <a:r>
+              <a:rPr lang="en-US" dirty="0" smtClean="0"/>
+              <a:t> , </a:t>
+            </a:r>
+            <a:r>
+              <a:rPr lang="en-US" i="1" dirty="0" smtClean="0"/>
+              <a:t>n</a:t>
+            </a:r>
+            <a:r>
+              <a:rPr lang="en-US" dirty="0" smtClean="0"/>
+              <a:t> = 10</a:t>
+            </a:r>
+            <a:r>
+              <a:rPr lang="en-US" baseline="30000" dirty="0" smtClean="0"/>
+              <a:t>6 </a:t>
+            </a:r>
+            <a:endParaRPr lang="en-US" i="1" baseline="30000" dirty="0"/>
           </a:p>
         </p:txBody>
       </p:sp>
@@ -3797,100 +4543,34 @@
           </a:p>
         </p:txBody>
       </p:sp>
-      <p:sp>
-        <p:nvSpPr>
-          <p:cNvPr id="3" name="Symbol zastępczy zawartości 2"/>
-          <p:cNvSpPr>
-            <a:spLocks noGrp="1"/>
-          </p:cNvSpPr>
+      <p:pic>
+        <p:nvPicPr>
+          <p:cNvPr id="4" name="Symbol zastępczy zawartości 3"/>
+          <p:cNvPicPr>
+            <a:picLocks noGrp="1" noChangeAspect="1"/>
+          </p:cNvPicPr>
           <p:nvPr>
             <p:ph idx="1"/>
           </p:nvPr>
-        </p:nvSpPr>
-        <p:spPr/>
-        <p:txBody>
-          <a:bodyPr/>
-          <a:lstStyle/>
-          <a:p>
-            <a:r>
-              <a:rPr lang="en-US" dirty="0" err="1" smtClean="0"/>
-              <a:t>Pogadanka</a:t>
-            </a:r>
-            <a:r>
-              <a:rPr lang="en-US" dirty="0" smtClean="0"/>
-              <a:t> o </a:t>
-            </a:r>
-            <a:r>
-              <a:rPr lang="en-US" dirty="0" err="1" smtClean="0"/>
-              <a:t>dmarfie</a:t>
-            </a:r>
-            <a:r>
-              <a:rPr lang="en-US" dirty="0" smtClean="0"/>
-              <a:t> I </a:t>
-            </a:r>
-            <a:r>
-              <a:rPr lang="en-US" dirty="0" err="1" smtClean="0"/>
-              <a:t>algorytmach</a:t>
-            </a:r>
-            <a:r>
-              <a:rPr lang="en-US" dirty="0" smtClean="0"/>
-              <a:t> </a:t>
-            </a:r>
-            <a:r>
-              <a:rPr lang="en-US" dirty="0" err="1" smtClean="0"/>
-              <a:t>minigu</a:t>
-            </a:r>
-            <a:r>
-              <a:rPr lang="en-US" dirty="0" smtClean="0"/>
-              <a:t> </a:t>
-            </a:r>
-            <a:r>
-              <a:rPr lang="en-US" dirty="0" err="1" smtClean="0"/>
-              <a:t>regul</a:t>
-            </a:r>
-            <a:r>
-              <a:rPr lang="en-US" dirty="0" smtClean="0"/>
-              <a:t> </a:t>
-            </a:r>
-            <a:r>
-              <a:rPr lang="en-US" dirty="0" err="1" smtClean="0"/>
-              <a:t>asocjacyjnych</a:t>
-            </a:r>
-            <a:endParaRPr lang="en-US" dirty="0" smtClean="0"/>
-          </a:p>
-          <a:p>
-            <a:r>
-              <a:rPr lang="en-US" dirty="0" err="1" smtClean="0"/>
-              <a:t>Pokazanie</a:t>
-            </a:r>
-            <a:r>
-              <a:rPr lang="en-US" dirty="0" smtClean="0"/>
-              <a:t> </a:t>
-            </a:r>
-            <a:r>
-              <a:rPr lang="en-US" dirty="0" err="1" smtClean="0"/>
-              <a:t>obrazka</a:t>
-            </a:r>
-            <a:r>
-              <a:rPr lang="en-US" dirty="0" smtClean="0"/>
-              <a:t> z </a:t>
-            </a:r>
-            <a:r>
-              <a:rPr lang="en-US" dirty="0" err="1" smtClean="0"/>
-              <a:t>indeksem</a:t>
-            </a:r>
-            <a:r>
-              <a:rPr lang="en-US" dirty="0" smtClean="0"/>
-              <a:t> z </a:t>
-            </a:r>
-            <a:r>
-              <a:rPr lang="en-US" dirty="0" err="1" smtClean="0"/>
-              <a:t>kosaraka</a:t>
-            </a:r>
-            <a:endParaRPr lang="en-US" dirty="0"/>
-          </a:p>
-        </p:txBody>
-      </p:sp>
+        </p:nvPicPr>
+        <p:blipFill rotWithShape="1">
+          <a:blip r:embed="rId2">
+            <a:extLst>
+              <a:ext uri="{28A0092B-C50C-407E-A947-70E740481C1C}">
+                <a14:useLocalDpi xmlns:a14="http://schemas.microsoft.com/office/drawing/2010/main" val="0"/>
+              </a:ext>
+            </a:extLst>
+          </a:blip>
+          <a:srcRect l="1638" t="3566" r="2102" b="3024"/>
+          <a:stretch/>
+        </p:blipFill>
+        <p:spPr>
+          <a:xfrm>
+            <a:off x="589085" y="1230923"/>
+            <a:ext cx="7139354" cy="5319346"/>
+          </a:xfrm>
+        </p:spPr>
+      </p:pic>
     </p:spTree>
     <p:extLst>
       <p:ext uri="{BB962C8B-B14F-4D97-AF65-F5344CB8AC3E}">
@@ -4001,7 +4681,19 @@
             <a:pPr indent="-342900"/>
             <a:r>
               <a:rPr lang="en-US" dirty="0" smtClean="0"/>
-              <a:t>OLTP can go along with B+ tree indices</a:t>
+              <a:t>OLTP </a:t>
+            </a:r>
+            <a:r>
+              <a:rPr lang="en-US" dirty="0" smtClean="0"/>
+              <a:t>withstands </a:t>
+            </a:r>
+            <a:r>
+              <a:rPr lang="en-US" dirty="0" smtClean="0"/>
+              <a:t>with </a:t>
+            </a:r>
+            <a:r>
+              <a:rPr lang="en-US" dirty="0" smtClean="0"/>
+              <a:t>B+ tree indices</a:t>
             </a:r>
           </a:p>
           <a:p>
@@ -4062,7 +4754,11 @@
           <a:bodyPr/>
           <a:lstStyle/>
           <a:p>
-            <a:endParaRPr lang="en-US"/>
+            <a:r>
+              <a:rPr lang="en-US" dirty="0" smtClean="0"/>
+              <a:t>RLE</a:t>
+            </a:r>
+            <a:endParaRPr lang="en-US" dirty="0"/>
           </a:p>
         </p:txBody>
       </p:sp>
@@ -4081,7 +4777,208 @@
           <a:bodyPr/>
           <a:lstStyle/>
           <a:p>
-            <a:endParaRPr lang="en-US"/>
+            <a:r>
+              <a:rPr lang="en-US" dirty="0" smtClean="0"/>
+              <a:t>Basic Run Length Encoding: </a:t>
+            </a:r>
+          </a:p>
+          <a:p>
+            <a:pPr marL="114300" indent="0">
+              <a:buNone/>
+            </a:pPr>
+            <a:r>
+              <a:rPr lang="en-US" dirty="0" smtClean="0">
+                <a:solidFill>
+                  <a:schemeClr val="accent2">
+                    <a:lumMod val="75000"/>
+                  </a:schemeClr>
+                </a:solidFill>
+              </a:rPr>
+              <a:t>000</a:t>
+            </a:r>
+            <a:r>
+              <a:rPr lang="en-US" dirty="0" smtClean="0">
+                <a:solidFill>
+                  <a:schemeClr val="accent1">
+                    <a:lumMod val="75000"/>
+                  </a:schemeClr>
+                </a:solidFill>
+              </a:rPr>
+              <a:t>11111</a:t>
+            </a:r>
+            <a:r>
+              <a:rPr lang="en-US" dirty="0" smtClean="0">
+                <a:solidFill>
+                  <a:schemeClr val="accent2">
+                    <a:lumMod val="75000"/>
+                  </a:schemeClr>
+                </a:solidFill>
+              </a:rPr>
+              <a:t>000</a:t>
+            </a:r>
+            <a:r>
+              <a:rPr lang="en-US" dirty="0" smtClean="0">
+                <a:solidFill>
+                  <a:schemeClr val="accent1">
+                    <a:lumMod val="75000"/>
+                  </a:schemeClr>
+                </a:solidFill>
+              </a:rPr>
+              <a:t>1</a:t>
+            </a:r>
+            <a:r>
+              <a:rPr lang="en-US" dirty="0" smtClean="0">
+                <a:solidFill>
+                  <a:schemeClr val="accent2">
+                    <a:lumMod val="75000"/>
+                  </a:schemeClr>
+                </a:solidFill>
+              </a:rPr>
+              <a:t>0</a:t>
+            </a:r>
+            <a:r>
+              <a:rPr lang="en-US" dirty="0" smtClean="0">
+                <a:solidFill>
+                  <a:schemeClr val="accent1">
+                    <a:lumMod val="75000"/>
+                  </a:schemeClr>
+                </a:solidFill>
+              </a:rPr>
+              <a:t>111</a:t>
+            </a:r>
+          </a:p>
+          <a:p>
+            <a:pPr marL="114300" indent="0">
+              <a:buNone/>
+            </a:pPr>
+            <a:r>
+              <a:rPr lang="en-US" dirty="0" smtClean="0">
+                <a:solidFill>
+                  <a:schemeClr val="accent2">
+                    <a:lumMod val="75000"/>
+                  </a:schemeClr>
+                </a:solidFill>
+              </a:rPr>
+              <a:t>3</a:t>
+            </a:r>
+            <a:r>
+              <a:rPr lang="en-US" dirty="0" smtClean="0">
+                <a:solidFill>
+                  <a:schemeClr val="accent1">
+                    <a:lumMod val="75000"/>
+                  </a:schemeClr>
+                </a:solidFill>
+              </a:rPr>
+              <a:t>     5        </a:t>
+            </a:r>
+            <a:r>
+              <a:rPr lang="en-US" dirty="0" smtClean="0">
+                <a:solidFill>
+                  <a:schemeClr val="accent2">
+                    <a:lumMod val="75000"/>
+                  </a:schemeClr>
+                </a:solidFill>
+              </a:rPr>
+              <a:t>3</a:t>
+            </a:r>
+            <a:r>
+              <a:rPr lang="en-US" dirty="0" smtClean="0">
+                <a:solidFill>
+                  <a:schemeClr val="accent1">
+                    <a:lumMod val="75000"/>
+                  </a:schemeClr>
+                </a:solidFill>
+              </a:rPr>
+              <a:t>     1</a:t>
+            </a:r>
+            <a:r>
+              <a:rPr lang="en-US" dirty="0" smtClean="0">
+                <a:solidFill>
+                  <a:schemeClr val="accent2">
+                    <a:lumMod val="75000"/>
+                  </a:schemeClr>
+                </a:solidFill>
+              </a:rPr>
+              <a:t>1</a:t>
+            </a:r>
+            <a:r>
+              <a:rPr lang="en-US" dirty="0" smtClean="0">
+                <a:solidFill>
+                  <a:schemeClr val="accent1">
+                    <a:lumMod val="75000"/>
+                  </a:schemeClr>
+                </a:solidFill>
+              </a:rPr>
+              <a:t>3</a:t>
+            </a:r>
+            <a:endParaRPr lang="en-US" dirty="0" smtClean="0">
+              <a:solidFill>
+                <a:schemeClr val="accent1">
+                  <a:lumMod val="75000"/>
+                </a:schemeClr>
+              </a:solidFill>
+            </a:endParaRPr>
+          </a:p>
+          <a:p>
+            <a:pPr marL="114300" indent="0">
+              <a:buNone/>
+            </a:pPr>
+            <a:endParaRPr lang="en-US" dirty="0" smtClean="0"/>
+          </a:p>
+          <a:p>
+            <a:r>
+              <a:rPr lang="en-US" dirty="0" smtClean="0"/>
+              <a:t>Can be worse than no encoding:</a:t>
+            </a:r>
+          </a:p>
+          <a:p>
+            <a:pPr marL="114300" indent="0">
+              <a:buNone/>
+            </a:pPr>
+            <a:r>
+              <a:rPr lang="en-US" dirty="0" smtClean="0">
+                <a:solidFill>
+                  <a:schemeClr val="accent2">
+                    <a:lumMod val="75000"/>
+                  </a:schemeClr>
+                </a:solidFill>
+              </a:rPr>
+              <a:t>11</a:t>
+            </a:r>
+            <a:r>
+              <a:rPr lang="en-US" dirty="0" smtClean="0"/>
+              <a:t> -&gt; </a:t>
+            </a:r>
+            <a:r>
+              <a:rPr lang="en-US" i="1" dirty="0" smtClean="0">
+                <a:solidFill>
+                  <a:srgbClr val="FF0000"/>
+                </a:solidFill>
+              </a:rPr>
+              <a:t>[00000010]</a:t>
+            </a:r>
+            <a:r>
+              <a:rPr lang="en-US" dirty="0" smtClean="0">
+                <a:solidFill>
+                  <a:schemeClr val="accent2">
+                    <a:lumMod val="75000"/>
+                  </a:schemeClr>
+                </a:solidFill>
+              </a:rPr>
+              <a:t>1 </a:t>
+            </a:r>
+          </a:p>
+          <a:p>
+            <a:endParaRPr lang="en-US" dirty="0" smtClean="0"/>
+          </a:p>
+          <a:p>
+            <a:endParaRPr lang="en-US" dirty="0" smtClean="0"/>
+          </a:p>
+          <a:p>
+            <a:endParaRPr lang="en-US" dirty="0" smtClean="0"/>
+          </a:p>
+          <a:p>
+            <a:endParaRPr lang="en-US" dirty="0"/>
           </a:p>
         </p:txBody>
       </p:sp>
@@ -4089,6 +4986,187 @@
     <p:extLst>
       <p:ext uri="{BB962C8B-B14F-4D97-AF65-F5344CB8AC3E}">
         <p14:creationId xmlns:p14="http://schemas.microsoft.com/office/powerpoint/2010/main" val="3776799707"/>
+      </p:ext>
+    </p:extLst>
+  </p:cSld>
+  <p:clrMapOvr>
+    <a:masterClrMapping/>
+  </p:clrMapOvr>
+</p:sld>
+</file>
+
+<file path=ppt/slides/slide9.xml><?xml version="1.0" encoding="utf-8"?>
+<p:sld xmlns:a="http://schemas.openxmlformats.org/drawingml/2006/main" xmlns:r="http://schemas.openxmlformats.org/officeDocument/2006/relationships" xmlns:p="http://schemas.openxmlformats.org/presentationml/2006/main">
+  <p:cSld>
+    <p:spTree>
+      <p:nvGrpSpPr>
+        <p:cNvPr id="1" name=""/>
+        <p:cNvGrpSpPr/>
+        <p:nvPr/>
+      </p:nvGrpSpPr>
+      <p:grpSpPr>
+        <a:xfrm>
+          <a:off x="0" y="0"/>
+          <a:ext cx="0" cy="0"/>
+          <a:chOff x="0" y="0"/>
+          <a:chExt cx="0" cy="0"/>
+        </a:xfrm>
+      </p:grpSpPr>
+      <p:sp>
+        <p:nvSpPr>
+          <p:cNvPr id="2" name="Tytuł 1"/>
+          <p:cNvSpPr>
+            <a:spLocks noGrp="1"/>
+          </p:cNvSpPr>
+          <p:nvPr>
+            <p:ph type="title"/>
+          </p:nvPr>
+        </p:nvSpPr>
+        <p:spPr/>
+        <p:txBody>
+          <a:bodyPr/>
+          <a:lstStyle/>
+          <a:p>
+            <a:r>
+              <a:rPr lang="en-US" dirty="0" smtClean="0"/>
+              <a:t>Delta &amp; Gamma Encoding	</a:t>
+            </a:r>
+            <a:endParaRPr lang="en-US" dirty="0"/>
+          </a:p>
+        </p:txBody>
+      </p:sp>
+      <p:sp>
+        <p:nvSpPr>
+          <p:cNvPr id="3" name="Symbol zastępczy zawartości 2"/>
+          <p:cNvSpPr>
+            <a:spLocks noGrp="1"/>
+          </p:cNvSpPr>
+          <p:nvPr>
+            <p:ph idx="1"/>
+          </p:nvPr>
+        </p:nvSpPr>
+        <p:spPr/>
+        <p:txBody>
+          <a:bodyPr/>
+          <a:lstStyle/>
+          <a:p>
+            <a:r>
+              <a:rPr lang="en-US" dirty="0" smtClean="0"/>
+              <a:t>Use no more than </a:t>
+            </a:r>
+            <a:r>
+              <a:rPr lang="en-US" i="1" dirty="0" smtClean="0"/>
+              <a:t>c </a:t>
+            </a:r>
+            <a:r>
+              <a:rPr lang="en-US" dirty="0" smtClean="0"/>
+              <a:t>log </a:t>
+            </a:r>
+            <a:r>
+              <a:rPr lang="en-US" i="1" dirty="0" smtClean="0"/>
+              <a:t>x </a:t>
+            </a:r>
+            <a:r>
+              <a:rPr lang="en-US" dirty="0" smtClean="0"/>
+              <a:t>bits to represent value</a:t>
+            </a:r>
+          </a:p>
+          <a:p>
+            <a:r>
+              <a:rPr lang="en-US" dirty="0" smtClean="0"/>
+              <a:t>Gamma Code:</a:t>
+            </a:r>
+          </a:p>
+          <a:p>
+            <a:pPr lvl="1"/>
+            <a:r>
+              <a:rPr lang="en-US" dirty="0" smtClean="0"/>
+              <a:t>TODO: </a:t>
+            </a:r>
+            <a:r>
+              <a:rPr lang="en-US" dirty="0" err="1" smtClean="0"/>
+              <a:t>opisac</a:t>
+            </a:r>
+            <a:r>
+              <a:rPr lang="en-US" dirty="0" smtClean="0"/>
+              <a:t> </a:t>
+            </a:r>
+            <a:r>
+              <a:rPr lang="en-US" dirty="0" err="1" smtClean="0"/>
+              <a:t>najlepiej</a:t>
+            </a:r>
+            <a:r>
+              <a:rPr lang="en-US" dirty="0" smtClean="0"/>
+              <a:t> </a:t>
+            </a:r>
+            <a:r>
+              <a:rPr lang="en-US" dirty="0" err="1" smtClean="0"/>
+              <a:t>na</a:t>
+            </a:r>
+            <a:r>
+              <a:rPr lang="en-US" dirty="0" smtClean="0"/>
+              <a:t> </a:t>
+            </a:r>
+            <a:r>
+              <a:rPr lang="en-US" dirty="0" err="1" smtClean="0"/>
+              <a:t>obrazku</a:t>
+            </a:r>
+            <a:endParaRPr lang="en-US" dirty="0"/>
+          </a:p>
+          <a:p>
+            <a:endParaRPr lang="en-US" dirty="0" smtClean="0"/>
+          </a:p>
+          <a:p>
+            <a:endParaRPr lang="en-US" dirty="0"/>
+          </a:p>
+          <a:p>
+            <a:r>
+              <a:rPr lang="en-US" dirty="0" smtClean="0"/>
+              <a:t>Delta Code:</a:t>
+            </a:r>
+          </a:p>
+          <a:p>
+            <a:pPr lvl="1"/>
+            <a:r>
+              <a:rPr lang="en-US" dirty="0" smtClean="0"/>
+              <a:t>TODO: </a:t>
+            </a:r>
+            <a:r>
+              <a:rPr lang="en-US" dirty="0" err="1" smtClean="0"/>
+              <a:t>opisac</a:t>
+            </a:r>
+            <a:r>
+              <a:rPr lang="en-US" dirty="0" smtClean="0"/>
+              <a:t> </a:t>
+            </a:r>
+            <a:r>
+              <a:rPr lang="en-US" dirty="0" err="1" smtClean="0"/>
+              <a:t>najlepiej</a:t>
+            </a:r>
+            <a:r>
+              <a:rPr lang="en-US" dirty="0" smtClean="0"/>
+              <a:t> </a:t>
+            </a:r>
+            <a:r>
+              <a:rPr lang="en-US" dirty="0" err="1" smtClean="0"/>
+              <a:t>na</a:t>
+            </a:r>
+            <a:r>
+              <a:rPr lang="en-US" dirty="0" smtClean="0"/>
+              <a:t> </a:t>
+            </a:r>
+            <a:r>
+              <a:rPr lang="en-US" dirty="0" err="1" smtClean="0"/>
+              <a:t>obrazku</a:t>
+            </a:r>
+            <a:endParaRPr lang="en-US" dirty="0"/>
+          </a:p>
+        </p:txBody>
+      </p:sp>
+    </p:spTree>
+    <p:extLst>
+      <p:ext uri="{BB962C8B-B14F-4D97-AF65-F5344CB8AC3E}">
+        <p14:creationId xmlns:p14="http://schemas.microsoft.com/office/powerpoint/2010/main" val="1427911116"/>
       </p:ext>
     </p:extLst>
   </p:cSld>

</xml_diff>